<commit_message>
Revisi, pulau->Domisili Jakarta + fix flowchart + fix bug
</commit_message>
<xml_diff>
--- a/Food Delivery System.pptx
+++ b/Food Delivery System.pptx
@@ -268,7 +268,7 @@
           <a:p>
             <a:fld id="{1F19A45D-7DA2-4C32-99C7-5202EC42A9E7}" type="datetimeFigureOut">
               <a:rPr lang="en-US" smtClean="0"/>
-              <a:t>10/20/2020</a:t>
+              <a:t>10/28/2020</a:t>
             </a:fld>
             <a:endParaRPr lang="en-US"/>
           </a:p>
@@ -466,7 +466,7 @@
           <a:p>
             <a:fld id="{1F19A45D-7DA2-4C32-99C7-5202EC42A9E7}" type="datetimeFigureOut">
               <a:rPr lang="en-US" smtClean="0"/>
-              <a:t>10/20/2020</a:t>
+              <a:t>10/28/2020</a:t>
             </a:fld>
             <a:endParaRPr lang="en-US"/>
           </a:p>
@@ -674,7 +674,7 @@
           <a:p>
             <a:fld id="{1F19A45D-7DA2-4C32-99C7-5202EC42A9E7}" type="datetimeFigureOut">
               <a:rPr lang="en-US" smtClean="0"/>
-              <a:t>10/20/2020</a:t>
+              <a:t>10/28/2020</a:t>
             </a:fld>
             <a:endParaRPr lang="en-US"/>
           </a:p>
@@ -872,7 +872,7 @@
           <a:p>
             <a:fld id="{1F19A45D-7DA2-4C32-99C7-5202EC42A9E7}" type="datetimeFigureOut">
               <a:rPr lang="en-US" smtClean="0"/>
-              <a:t>10/20/2020</a:t>
+              <a:t>10/28/2020</a:t>
             </a:fld>
             <a:endParaRPr lang="en-US"/>
           </a:p>
@@ -1147,7 +1147,7 @@
           <a:p>
             <a:fld id="{1F19A45D-7DA2-4C32-99C7-5202EC42A9E7}" type="datetimeFigureOut">
               <a:rPr lang="en-US" smtClean="0"/>
-              <a:t>10/20/2020</a:t>
+              <a:t>10/28/2020</a:t>
             </a:fld>
             <a:endParaRPr lang="en-US"/>
           </a:p>
@@ -1412,7 +1412,7 @@
           <a:p>
             <a:fld id="{1F19A45D-7DA2-4C32-99C7-5202EC42A9E7}" type="datetimeFigureOut">
               <a:rPr lang="en-US" smtClean="0"/>
-              <a:t>10/20/2020</a:t>
+              <a:t>10/28/2020</a:t>
             </a:fld>
             <a:endParaRPr lang="en-US"/>
           </a:p>
@@ -1824,7 +1824,7 @@
           <a:p>
             <a:fld id="{1F19A45D-7DA2-4C32-99C7-5202EC42A9E7}" type="datetimeFigureOut">
               <a:rPr lang="en-US" smtClean="0"/>
-              <a:t>10/20/2020</a:t>
+              <a:t>10/28/2020</a:t>
             </a:fld>
             <a:endParaRPr lang="en-US"/>
           </a:p>
@@ -1965,7 +1965,7 @@
           <a:p>
             <a:fld id="{1F19A45D-7DA2-4C32-99C7-5202EC42A9E7}" type="datetimeFigureOut">
               <a:rPr lang="en-US" smtClean="0"/>
-              <a:t>10/20/2020</a:t>
+              <a:t>10/28/2020</a:t>
             </a:fld>
             <a:endParaRPr lang="en-US"/>
           </a:p>
@@ -2078,7 +2078,7 @@
           <a:p>
             <a:fld id="{1F19A45D-7DA2-4C32-99C7-5202EC42A9E7}" type="datetimeFigureOut">
               <a:rPr lang="en-US" smtClean="0"/>
-              <a:t>10/20/2020</a:t>
+              <a:t>10/28/2020</a:t>
             </a:fld>
             <a:endParaRPr lang="en-US"/>
           </a:p>
@@ -2389,7 +2389,7 @@
           <a:p>
             <a:fld id="{1F19A45D-7DA2-4C32-99C7-5202EC42A9E7}" type="datetimeFigureOut">
               <a:rPr lang="en-US" smtClean="0"/>
-              <a:t>10/20/2020</a:t>
+              <a:t>10/28/2020</a:t>
             </a:fld>
             <a:endParaRPr lang="en-US"/>
           </a:p>
@@ -2677,7 +2677,7 @@
           <a:p>
             <a:fld id="{1F19A45D-7DA2-4C32-99C7-5202EC42A9E7}" type="datetimeFigureOut">
               <a:rPr lang="en-US" smtClean="0"/>
-              <a:t>10/20/2020</a:t>
+              <a:t>10/28/2020</a:t>
             </a:fld>
             <a:endParaRPr lang="en-US"/>
           </a:p>
@@ -2918,7 +2918,7 @@
           <a:p>
             <a:fld id="{1F19A45D-7DA2-4C32-99C7-5202EC42A9E7}" type="datetimeFigureOut">
               <a:rPr lang="en-US" smtClean="0"/>
-              <a:t>10/20/2020</a:t>
+              <a:t>10/28/2020</a:t>
             </a:fld>
             <a:endParaRPr lang="en-US"/>
           </a:p>
@@ -4796,10 +4796,10 @@
       </p:grpSpPr>
       <p:pic>
         <p:nvPicPr>
-          <p:cNvPr id="7" name="Content Placeholder 6" descr="Diagram, schematic&#10;&#10;Description automatically generated">
-            <a:extLst>
-              <a:ext uri="{FF2B5EF4-FFF2-40B4-BE49-F238E27FC236}">
-                <a16:creationId xmlns:a16="http://schemas.microsoft.com/office/drawing/2014/main" id="{264F1445-50F0-4CC6-8AC6-CDB693147BA4}"/>
+          <p:cNvPr id="5" name="Content Placeholder 4" descr="Diagram, schematic&#10;&#10;Description automatically generated">
+            <a:extLst>
+              <a:ext uri="{FF2B5EF4-FFF2-40B4-BE49-F238E27FC236}">
+                <a16:creationId xmlns:a16="http://schemas.microsoft.com/office/drawing/2014/main" id="{DF9F61F5-0D35-40A1-8170-E3A4A0F30A08}"/>
               </a:ext>
             </a:extLst>
           </p:cNvPr>
@@ -4824,8 +4824,8 @@
         </p:blipFill>
         <p:spPr>
           <a:xfrm>
-            <a:off x="1752320" y="0"/>
-            <a:ext cx="9080780" cy="6869759"/>
+            <a:off x="1816230" y="0"/>
+            <a:ext cx="8559539" cy="6857193"/>
           </a:xfrm>
         </p:spPr>
       </p:pic>
@@ -5180,10 +5180,10 @@
       </p:sp>
       <p:pic>
         <p:nvPicPr>
-          <p:cNvPr id="7" name="Content Placeholder 6" descr="Text&#10;&#10;Description automatically generated">
-            <a:extLst>
-              <a:ext uri="{FF2B5EF4-FFF2-40B4-BE49-F238E27FC236}">
-                <a16:creationId xmlns:a16="http://schemas.microsoft.com/office/drawing/2014/main" id="{CE623B27-0F77-47AD-A4DD-C9A1F91F34D2}"/>
+          <p:cNvPr id="6" name="Content Placeholder 5" descr="Text&#10;&#10;Description automatically generated">
+            <a:extLst>
+              <a:ext uri="{FF2B5EF4-FFF2-40B4-BE49-F238E27FC236}">
+                <a16:creationId xmlns:a16="http://schemas.microsoft.com/office/drawing/2014/main" id="{7A3D3474-8CC1-48F6-B49C-FDDAD966924C}"/>
               </a:ext>
             </a:extLst>
           </p:cNvPr>
@@ -5208,8 +5208,8 @@
         </p:blipFill>
         <p:spPr>
           <a:xfrm>
-            <a:off x="2255744" y="1825625"/>
-            <a:ext cx="7680511" cy="4351338"/>
+            <a:off x="2253006" y="1776403"/>
+            <a:ext cx="7600968" cy="4400560"/>
           </a:xfrm>
         </p:spPr>
       </p:pic>

</xml_diff>